<commit_message>
Updated presentation with demo graphics
</commit_message>
<xml_diff>
--- a/Final_Presentation_Poster.pptx
+++ b/Final_Presentation_Poster.pptx
@@ -10324,11 +10324,7 @@
             </a:pPr>
             <a:r>
               <a:rPr lang="en-US" sz="1867" dirty="0" smtClean="0"/>
-              <a:t>With in micro-grids the problem of when to discharge th</a:t>
-            </a:r>
-            <a:r>
-              <a:rPr lang="en-US" sz="1867" dirty="0" smtClean="0"/>
-              <a:t>e battery, as well as by how much, causes significant inefficiency in the system. The problem addressed in this project was that of optimization of a micro-grid. Using a V-Learning algorithm to calculate the best times and intervals to discharge and charge the battery increased the net gain of the system. (SOMETHING LIKE THIS?)</a:t>
+              <a:t>With in micro-grids the problem of when to discharge the battery, as well as by how much, causes significant inefficiency in the system. The problem addressed in this project was that of optimization of a micro-grid. Using a V-Learning algorithm to calculate the best times and intervals to discharge and charge the battery increased the net gain of the system. (SOMETHING LIKE THIS?)</a:t>
             </a:r>
             <a:endParaRPr lang="en-US" sz="1867" dirty="0"/>
           </a:p>
@@ -11680,6 +11676,66 @@
           </a:p>
         </p:txBody>
       </p:sp>
+      <p:pic>
+        <p:nvPicPr>
+          <p:cNvPr id="6" name="Picture 5"/>
+          <p:cNvPicPr>
+            <a:picLocks noChangeAspect="1"/>
+          </p:cNvPicPr>
+          <p:nvPr/>
+        </p:nvPicPr>
+        <p:blipFill>
+          <a:blip r:embed="rId5">
+            <a:extLst>
+              <a:ext uri="{28A0092B-C50C-407E-A947-70E740481C1C}">
+                <a14:useLocalDpi xmlns:a14="http://schemas.microsoft.com/office/drawing/2010/main" val="0"/>
+              </a:ext>
+            </a:extLst>
+          </a:blip>
+          <a:stretch>
+            <a:fillRect/>
+          </a:stretch>
+        </p:blipFill>
+        <p:spPr>
+          <a:xfrm>
+            <a:off x="9068732" y="5792877"/>
+            <a:ext cx="7495867" cy="3938258"/>
+          </a:xfrm>
+          <a:prstGeom prst="rect">
+            <a:avLst/>
+          </a:prstGeom>
+        </p:spPr>
+      </p:pic>
+      <p:pic>
+        <p:nvPicPr>
+          <p:cNvPr id="7" name="Picture 6"/>
+          <p:cNvPicPr>
+            <a:picLocks noChangeAspect="1"/>
+          </p:cNvPicPr>
+          <p:nvPr/>
+        </p:nvPicPr>
+        <p:blipFill>
+          <a:blip r:embed="rId6">
+            <a:extLst>
+              <a:ext uri="{28A0092B-C50C-407E-A947-70E740481C1C}">
+                <a14:useLocalDpi xmlns:a14="http://schemas.microsoft.com/office/drawing/2010/main" val="0"/>
+              </a:ext>
+            </a:extLst>
+          </a:blip>
+          <a:stretch>
+            <a:fillRect/>
+          </a:stretch>
+        </p:blipFill>
+        <p:spPr>
+          <a:xfrm>
+            <a:off x="9068732" y="12958250"/>
+            <a:ext cx="7409202" cy="3892725"/>
+          </a:xfrm>
+          <a:prstGeom prst="rect">
+            <a:avLst/>
+          </a:prstGeom>
+        </p:spPr>
+      </p:pic>
     </p:spTree>
   </p:cSld>
   <p:clrMapOvr>

</xml_diff>

<commit_message>
Updated Abstract, Problem Descr, and Method
</commit_message>
<xml_diff>
--- a/Final_Presentation_Poster.pptx
+++ b/Final_Presentation_Poster.pptx
@@ -9268,7 +9268,15 @@
           <a:p>
             <a:r>
               <a:rPr lang="en-US" sz="2000" dirty="0"/>
-              <a:t>The rapid deployment and optimal operation of Micro-grids is an essential step </a:t>
+              <a:t>The rapid deployment and optimal operation of </a:t>
+            </a:r>
+            <a:r>
+              <a:rPr lang="en-US" sz="2000" dirty="0" smtClean="0"/>
+              <a:t>micro-grids </a:t>
+            </a:r>
+            <a:r>
+              <a:rPr lang="en-US" sz="2000" dirty="0"/>
+              <a:t>is an essential step </a:t>
             </a:r>
             <a:r>
               <a:rPr lang="en-US" sz="2000" dirty="0" smtClean="0"/>
@@ -9284,13 +9292,29 @@
             </a:r>
             <a:r>
               <a:rPr lang="en-US" sz="2000" dirty="0"/>
-              <a:t>availability in developing countries. Micro grids integrate local energy generation</a:t>
-            </a:r>
-          </a:p>
-          <a:p>
+              <a:t>availability in developing countries. </a:t>
+            </a:r>
+            <a:r>
+              <a:rPr lang="en-US" sz="2000" dirty="0" smtClean="0"/>
+              <a:t>Micro-grids </a:t>
+            </a:r>
             <a:r>
               <a:rPr lang="en-US" sz="2000" dirty="0"/>
-              <a:t>and storage, local loads and run in isolation or with a </a:t>
+              <a:t>integrate local energy generation</a:t>
+            </a:r>
+          </a:p>
+          <a:p>
+            <a:r>
+              <a:rPr lang="en-US" sz="2000" dirty="0"/>
+              <a:t>and storage, local </a:t>
+            </a:r>
+            <a:r>
+              <a:rPr lang="en-US" sz="2000" dirty="0" smtClean="0"/>
+              <a:t>loads, </a:t>
+            </a:r>
+            <a:r>
+              <a:rPr lang="en-US" sz="2000" dirty="0"/>
+              <a:t>and run in isolation or with a </a:t>
             </a:r>
             <a:r>
               <a:rPr lang="en-US" sz="2000" dirty="0" smtClean="0"/>
@@ -9314,7 +9338,15 @@
             </a:r>
             <a:r>
               <a:rPr lang="en-US" sz="2000" dirty="0"/>
-              <a:t>, it is possible to determine the optimal operating policy. This paper presents </a:t>
+              <a:t>, it is possible to determine the optimal operating policy. This </a:t>
+            </a:r>
+            <a:r>
+              <a:rPr lang="en-US" sz="2000" dirty="0" smtClean="0"/>
+              <a:t>poster </a:t>
+            </a:r>
+            <a:r>
+              <a:rPr lang="en-US" sz="2000" dirty="0"/>
+              <a:t>presents </a:t>
             </a:r>
             <a:r>
               <a:rPr lang="en-US" sz="2000" dirty="0" smtClean="0"/>
@@ -9322,15 +9354,15 @@
             </a:r>
             <a:r>
               <a:rPr lang="en-US" sz="2000" dirty="0"/>
-              <a:t>that combines historical weather and usage data with neural-network </a:t>
+              <a:t>that combines historical weather and usage data </a:t>
             </a:r>
             <a:r>
               <a:rPr lang="en-US" sz="2000" dirty="0" smtClean="0"/>
-              <a:t>prediction and </a:t>
+              <a:t>with reinforcement </a:t>
             </a:r>
             <a:r>
               <a:rPr lang="en-US" sz="2000" dirty="0"/>
-              <a:t>reinforcement learning methods to determine this policy. The results of this </a:t>
+              <a:t>learning methods to determine this policy. The results of this </a:t>
             </a:r>
             <a:r>
               <a:rPr lang="en-US" sz="2000" dirty="0" smtClean="0"/>
@@ -9346,8 +9378,21 @@
             </a:r>
             <a:r>
               <a:rPr lang="en-US" sz="2000" dirty="0"/>
-              <a:t>net gain of a Micro-grid can completely offset the cost of operation.</a:t>
-            </a:r>
+              <a:t>net gain of a </a:t>
+            </a:r>
+            <a:r>
+              <a:rPr lang="en-US" sz="2000" dirty="0" smtClean="0"/>
+              <a:t>micro-grid </a:t>
+            </a:r>
+            <a:r>
+              <a:rPr lang="en-US" sz="2000" dirty="0"/>
+              <a:t>can </a:t>
+            </a:r>
+            <a:r>
+              <a:rPr lang="en-US" sz="2000" dirty="0" smtClean="0"/>
+              <a:t>be significantly improved.</a:t>
+            </a:r>
+            <a:endParaRPr lang="en-US" sz="2000" dirty="0"/>
           </a:p>
           <a:p>
             <a:pPr>
@@ -10299,8 +10344,8 @@
         </p:nvSpPr>
         <p:spPr>
           <a:xfrm>
-            <a:off x="601797" y="8839851"/>
-            <a:ext cx="7928199" cy="2951549"/>
+            <a:off x="601797" y="8839852"/>
+            <a:ext cx="7928199" cy="2078520"/>
           </a:xfrm>
           <a:prstGeom prst="rect">
             <a:avLst/>
@@ -10324,7 +10369,31 @@
             </a:pPr>
             <a:r>
               <a:rPr lang="en-US" sz="1867" dirty="0" smtClean="0"/>
-              <a:t>With in micro-grids the problem of when to discharge the battery, as well as by how much, causes significant inefficiency in the system. The problem addressed in this project was that of optimization of a micro-grid. Using a V-Learning algorithm to calculate the best times and intervals to discharge and charge the battery increased the net gain of the system. (SOMETHING LIKE THIS?)</a:t>
+              <a:t>Within micro-grids, </a:t>
+            </a:r>
+            <a:r>
+              <a:rPr lang="en-US" sz="1867" dirty="0" smtClean="0"/>
+              <a:t>the problem of when to discharge the battery, as well as by how much, causes significant inefficiency in the system. The problem addressed in this project was that of optimization of a micro-grid. Using </a:t>
+            </a:r>
+            <a:r>
+              <a:rPr lang="en-US" sz="1867" dirty="0" smtClean="0"/>
+              <a:t>a reinforcement learning algorithm, value iteration, to </a:t>
+            </a:r>
+            <a:r>
+              <a:rPr lang="en-US" sz="1867" dirty="0" smtClean="0"/>
+              <a:t>calculate the best times and intervals to discharge and </a:t>
+            </a:r>
+            <a:r>
+              <a:rPr lang="en-US" sz="1867" dirty="0" smtClean="0"/>
+              <a:t>charge, </a:t>
+            </a:r>
+            <a:r>
+              <a:rPr lang="en-US" sz="1867" dirty="0" smtClean="0"/>
+              <a:t>the battery increased the net gain of the </a:t>
+            </a:r>
+            <a:r>
+              <a:rPr lang="en-US" sz="1867" dirty="0" smtClean="0"/>
+              <a:t>system.</a:t>
             </a:r>
             <a:endParaRPr lang="en-US" sz="1867" dirty="0"/>
           </a:p>
@@ -10417,23 +10486,9 @@
             </a:pPr>
             <a:r>
               <a:rPr lang="en-US" sz="1867" dirty="0" smtClean="0"/>
-              <a:t>If we implement the NN we will have to change the model and reward function from deterministic to probabilistic. Won’t this require a lot of our code to change??? If not what is a good way to make it not need to change a lot.</a:t>
+              <a:t>The approach used to optimize energy management in the battery was the reinforcement learning algorithm of value iteration. The state examined during the derivation of the optimal policy consisted of the charge in the battery and the time of day. The intermittent reward occurs at the end of every day and is the dollar equivalent of the energy stored in the battery.</a:t>
             </a:r>
             <a:endParaRPr lang="en-US" sz="1867" dirty="0"/>
-          </a:p>
-          <a:p>
-            <a:pPr>
-              <a:buClr>
-                <a:srgbClr val="000000"/>
-              </a:buClr>
-              <a:buSzPct val="25000"/>
-              <a:buFont typeface="Arial"/>
-              <a:buChar char=""/>
-            </a:pPr>
-            <a:r>
-              <a:rPr lang="en-US" sz="1867" dirty="0"/>
-              <a:t> </a:t>
-            </a:r>
           </a:p>
         </p:txBody>
       </p:sp>
@@ -10472,92 +10527,6 @@
               <a:rPr lang="en-US" sz="2800" b="1" dirty="0"/>
               <a:t>Method</a:t>
             </a:r>
-          </a:p>
-        </p:txBody>
-      </p:sp>
-      <p:sp>
-        <p:nvSpPr>
-          <p:cNvPr id="66" name="TextBox 65"/>
-          <p:cNvSpPr txBox="1"/>
-          <p:nvPr/>
-        </p:nvSpPr>
-        <p:spPr>
-          <a:xfrm>
-            <a:off x="4632766" y="15810796"/>
-            <a:ext cx="2870784" cy="5424562"/>
-          </a:xfrm>
-          <a:prstGeom prst="rect">
-            <a:avLst/>
-          </a:prstGeom>
-          <a:solidFill>
-            <a:schemeClr val="bg2"/>
-          </a:solidFill>
-        </p:spPr>
-        <p:txBody>
-          <a:bodyPr wrap="square" rtlCol="0">
-            <a:spAutoFit/>
-          </a:bodyPr>
-          <a:lstStyle/>
-          <a:p>
-            <a:endParaRPr lang="en-US" sz="3150" dirty="0">
-              <a:solidFill>
-                <a:schemeClr val="tx1"/>
-              </a:solidFill>
-            </a:endParaRPr>
-          </a:p>
-          <a:p>
-            <a:endParaRPr lang="en-US" sz="3150" dirty="0">
-              <a:solidFill>
-                <a:schemeClr val="bg1"/>
-              </a:solidFill>
-            </a:endParaRPr>
-          </a:p>
-          <a:p>
-            <a:r>
-              <a:rPr lang="en-US" sz="3150" dirty="0">
-                <a:solidFill>
-                  <a:schemeClr val="bg1"/>
-                </a:solidFill>
-              </a:rPr>
-              <a:t>Graphical representation for the method: Picture/</a:t>
-            </a:r>
-          </a:p>
-          <a:p>
-            <a:r>
-              <a:rPr lang="en-US" sz="3150" dirty="0">
-                <a:solidFill>
-                  <a:schemeClr val="bg1"/>
-                </a:solidFill>
-              </a:rPr>
-              <a:t>Algorithm</a:t>
-            </a:r>
-          </a:p>
-          <a:p>
-            <a:r>
-              <a:rPr lang="en-US" sz="3150" dirty="0">
-                <a:solidFill>
-                  <a:schemeClr val="bg1"/>
-                </a:solidFill>
-              </a:rPr>
-              <a:t>Flowchart/</a:t>
-            </a:r>
-          </a:p>
-          <a:p>
-            <a:r>
-              <a:rPr lang="en-US" sz="3150" dirty="0">
-                <a:solidFill>
-                  <a:schemeClr val="bg1"/>
-                </a:solidFill>
-              </a:rPr>
-              <a:t>Equations</a:t>
-            </a:r>
-          </a:p>
-          <a:p>
-            <a:endParaRPr lang="en-US" sz="3150" dirty="0">
-              <a:solidFill>
-                <a:schemeClr val="tx1"/>
-              </a:solidFill>
-            </a:endParaRPr>
           </a:p>
         </p:txBody>
       </p:sp>
@@ -11343,62 +11312,6 @@
               <a:rPr lang="en-US" sz="2800" b="1" dirty="0"/>
               <a:t>References</a:t>
             </a:r>
-          </a:p>
-        </p:txBody>
-      </p:sp>
-      <p:sp>
-        <p:nvSpPr>
-          <p:cNvPr id="89" name="TextBox 88"/>
-          <p:cNvSpPr txBox="1"/>
-          <p:nvPr/>
-        </p:nvSpPr>
-        <p:spPr>
-          <a:xfrm>
-            <a:off x="4320576" y="10746808"/>
-            <a:ext cx="3404913" cy="3000821"/>
-          </a:xfrm>
-          <a:prstGeom prst="rect">
-            <a:avLst/>
-          </a:prstGeom>
-          <a:solidFill>
-            <a:schemeClr val="bg2"/>
-          </a:solidFill>
-        </p:spPr>
-        <p:txBody>
-          <a:bodyPr wrap="square" rtlCol="0">
-            <a:spAutoFit/>
-          </a:bodyPr>
-          <a:lstStyle/>
-          <a:p>
-            <a:endParaRPr lang="en-US" sz="3150" dirty="0">
-              <a:solidFill>
-                <a:schemeClr val="tx1"/>
-              </a:solidFill>
-            </a:endParaRPr>
-          </a:p>
-          <a:p>
-            <a:endParaRPr lang="en-US" sz="3150" dirty="0">
-              <a:solidFill>
-                <a:schemeClr val="tx1"/>
-              </a:solidFill>
-            </a:endParaRPr>
-          </a:p>
-          <a:p>
-            <a:r>
-              <a:rPr lang="en-US" sz="3150" dirty="0">
-                <a:solidFill>
-                  <a:schemeClr val="bg1"/>
-                </a:solidFill>
-              </a:rPr>
-              <a:t>Graphical representation Problem</a:t>
-            </a:r>
-          </a:p>
-          <a:p>
-            <a:endParaRPr lang="en-US" sz="3150" dirty="0">
-              <a:solidFill>
-                <a:schemeClr val="tx1"/>
-              </a:solidFill>
-            </a:endParaRPr>
           </a:p>
         </p:txBody>
       </p:sp>
@@ -11760,6 +11673,196 @@
           <a:xfrm>
             <a:off x="12984882" y="9543608"/>
             <a:ext cx="3541178" cy="1509137"/>
+          </a:xfrm>
+          <a:prstGeom prst="rect">
+            <a:avLst/>
+          </a:prstGeom>
+        </p:spPr>
+      </p:pic>
+      <p:pic>
+        <p:nvPicPr>
+          <p:cNvPr id="6" name="Picture 5"/>
+          <p:cNvPicPr>
+            <a:picLocks noChangeAspect="1"/>
+          </p:cNvPicPr>
+          <p:nvPr/>
+        </p:nvPicPr>
+        <p:blipFill>
+          <a:blip r:embed="rId8">
+            <a:extLst>
+              <a:ext uri="{28A0092B-C50C-407E-A947-70E740481C1C}">
+                <a14:useLocalDpi xmlns:a14="http://schemas.microsoft.com/office/drawing/2010/main" val="0"/>
+              </a:ext>
+            </a:extLst>
+          </a:blip>
+          <a:stretch>
+            <a:fillRect/>
+          </a:stretch>
+        </p:blipFill>
+        <p:spPr>
+          <a:xfrm>
+            <a:off x="4981710" y="11484239"/>
+            <a:ext cx="1896456" cy="1896456"/>
+          </a:xfrm>
+          <a:prstGeom prst="rect">
+            <a:avLst/>
+          </a:prstGeom>
+        </p:spPr>
+      </p:pic>
+      <p:pic>
+        <p:nvPicPr>
+          <p:cNvPr id="12" name="Picture 11"/>
+          <p:cNvPicPr>
+            <a:picLocks noChangeAspect="1"/>
+          </p:cNvPicPr>
+          <p:nvPr/>
+        </p:nvPicPr>
+        <p:blipFill>
+          <a:blip r:embed="rId9">
+            <a:extLst>
+              <a:ext uri="{28A0092B-C50C-407E-A947-70E740481C1C}">
+                <a14:useLocalDpi xmlns:a14="http://schemas.microsoft.com/office/drawing/2010/main" val="0"/>
+              </a:ext>
+            </a:extLst>
+          </a:blip>
+          <a:stretch>
+            <a:fillRect/>
+          </a:stretch>
+        </p:blipFill>
+        <p:spPr>
+          <a:xfrm>
+            <a:off x="5900892" y="11660510"/>
+            <a:ext cx="2424576" cy="2067637"/>
+          </a:xfrm>
+          <a:prstGeom prst="rect">
+            <a:avLst/>
+          </a:prstGeom>
+        </p:spPr>
+      </p:pic>
+      <p:pic>
+        <p:nvPicPr>
+          <p:cNvPr id="14" name="Picture 13"/>
+          <p:cNvPicPr>
+            <a:picLocks noChangeAspect="1"/>
+          </p:cNvPicPr>
+          <p:nvPr/>
+        </p:nvPicPr>
+        <p:blipFill>
+          <a:blip r:embed="rId10">
+            <a:extLst>
+              <a:ext uri="{28A0092B-C50C-407E-A947-70E740481C1C}">
+                <a14:useLocalDpi xmlns:a14="http://schemas.microsoft.com/office/drawing/2010/main" val="0"/>
+              </a:ext>
+            </a:extLst>
+          </a:blip>
+          <a:stretch>
+            <a:fillRect/>
+          </a:stretch>
+        </p:blipFill>
+        <p:spPr>
+          <a:xfrm>
+            <a:off x="696591" y="10964749"/>
+            <a:ext cx="3637981" cy="1878049"/>
+          </a:xfrm>
+          <a:prstGeom prst="rect">
+            <a:avLst/>
+          </a:prstGeom>
+        </p:spPr>
+      </p:pic>
+      <p:sp>
+        <p:nvSpPr>
+          <p:cNvPr id="17" name="Freeform 16"/>
+          <p:cNvSpPr/>
+          <p:nvPr/>
+        </p:nvSpPr>
+        <p:spPr>
+          <a:xfrm>
+            <a:off x="3657602" y="12803212"/>
+            <a:ext cx="2035462" cy="314075"/>
+          </a:xfrm>
+          <a:custGeom>
+            <a:avLst/>
+            <a:gdLst>
+              <a:gd name="connsiteX0" fmla="*/ 0 w 2035462"/>
+              <a:gd name="connsiteY0" fmla="*/ 20160 h 314075"/>
+              <a:gd name="connsiteX1" fmla="*/ 1730829 w 2035462"/>
+              <a:gd name="connsiteY1" fmla="*/ 31046 h 314075"/>
+              <a:gd name="connsiteX2" fmla="*/ 2024743 w 2035462"/>
+              <a:gd name="connsiteY2" fmla="*/ 314075 h 314075"/>
+            </a:gdLst>
+            <a:ahLst/>
+            <a:cxnLst>
+              <a:cxn ang="0">
+                <a:pos x="connsiteX0" y="connsiteY0"/>
+              </a:cxn>
+              <a:cxn ang="0">
+                <a:pos x="connsiteX1" y="connsiteY1"/>
+              </a:cxn>
+              <a:cxn ang="0">
+                <a:pos x="connsiteX2" y="connsiteY2"/>
+              </a:cxn>
+            </a:cxnLst>
+            <a:rect l="l" t="t" r="r" b="b"/>
+            <a:pathLst>
+              <a:path w="2035462" h="314075">
+                <a:moveTo>
+                  <a:pt x="0" y="20160"/>
+                </a:moveTo>
+                <a:cubicBezTo>
+                  <a:pt x="696686" y="1110"/>
+                  <a:pt x="1393372" y="-17940"/>
+                  <a:pt x="1730829" y="31046"/>
+                </a:cubicBezTo>
+                <a:cubicBezTo>
+                  <a:pt x="2068286" y="80032"/>
+                  <a:pt x="2046514" y="197053"/>
+                  <a:pt x="2024743" y="314075"/>
+                </a:cubicBezTo>
+              </a:path>
+            </a:pathLst>
+          </a:custGeom>
+        </p:spPr>
+        <p:style>
+          <a:lnRef idx="3">
+            <a:schemeClr val="dk1"/>
+          </a:lnRef>
+          <a:fillRef idx="0">
+            <a:schemeClr val="dk1"/>
+          </a:fillRef>
+          <a:effectRef idx="2">
+            <a:schemeClr val="dk1"/>
+          </a:effectRef>
+          <a:fontRef idx="minor">
+            <a:schemeClr val="tx1"/>
+          </a:fontRef>
+        </p:style>
+        <p:txBody>
+          <a:bodyPr rtlCol="0" anchor="ctr"/>
+          <a:lstStyle/>
+          <a:p>
+            <a:pPr algn="ctr"/>
+            <a:endParaRPr lang="en-US"/>
+          </a:p>
+        </p:txBody>
+      </p:sp>
+      <p:pic>
+        <p:nvPicPr>
+          <p:cNvPr id="21" name="Picture 20"/>
+          <p:cNvPicPr>
+            <a:picLocks noChangeAspect="1"/>
+          </p:cNvPicPr>
+          <p:nvPr/>
+        </p:nvPicPr>
+        <p:blipFill>
+          <a:blip r:embed="rId11"/>
+          <a:stretch>
+            <a:fillRect/>
+          </a:stretch>
+        </p:blipFill>
+        <p:spPr>
+          <a:xfrm>
+            <a:off x="1426856" y="16230007"/>
+            <a:ext cx="6289753" cy="2299065"/>
           </a:xfrm>
           <a:prstGeom prst="rect">
             <a:avLst/>

</xml_diff>

<commit_message>
debugged and scaled the thing, the whole thing.
</commit_message>
<xml_diff>
--- a/Final_Presentation_Poster.pptx
+++ b/Final_Presentation_Poster.pptx
@@ -10591,14 +10591,294 @@
                 <a:srgbClr val="000000"/>
               </a:buClr>
               <a:buSzPct val="25000"/>
-              <a:buFont typeface="Arial"/>
-              <a:buChar char=""/>
             </a:pPr>
             <a:r>
-              <a:rPr lang="en-US" sz="1867" dirty="0"/>
-              <a:t>XXXXXXXXXXXXXXXXXXXXXXXXXXXXXXXXXXXXXXXXXXXXXXXXXXXXXXXXXXXXXXXXXXXXXXXXXXXXXXXXXXXXXXXXXXXXXXXXXXXXXXXXXXXXXXXXXXXXXXXXXXXXXXXXXXXXXXXXXXXXXXXXXXXXXXXXXXXXXXXXXXXXXXXXXXXXXXXXXXXXXXXXXXXXXXXXXXX.</a:t>
-            </a:r>
-          </a:p>
+              <a:rPr lang="en-US" sz="1867" dirty="0" smtClean="0"/>
+              <a:t>Using a </a:t>
+            </a:r>
+            <a:r>
+              <a:rPr lang="en-US" sz="1867" smtClean="0"/>
+              <a:t>dummy load</a:t>
+            </a:r>
+            <a:endParaRPr lang="en-US" sz="1867" dirty="0"/>
+          </a:p>
+        </p:txBody>
+      </p:sp>
+      <p:sp>
+        <p:nvSpPr>
+          <p:cNvPr id="68" name="Shape 133"/>
+          <p:cNvSpPr txBox="1"/>
+          <p:nvPr/>
+        </p:nvSpPr>
+        <p:spPr>
+          <a:xfrm>
+            <a:off x="8938705" y="3318264"/>
+            <a:ext cx="7917349" cy="430674"/>
+          </a:xfrm>
+          <a:prstGeom prst="rect">
+            <a:avLst/>
+          </a:prstGeom>
+          <a:noFill/>
+          <a:ln>
+            <a:noFill/>
+          </a:ln>
+        </p:spPr>
+        <p:txBody>
+          <a:bodyPr lIns="53331" tIns="53331" rIns="53331" bIns="53331" anchor="ctr" anchorCtr="0">
+            <a:noAutofit/>
+          </a:bodyPr>
+          <a:lstStyle/>
+          <a:p>
+            <a:pPr>
+              <a:buClr>
+                <a:srgbClr val="000000"/>
+              </a:buClr>
+              <a:buSzPct val="25000"/>
+            </a:pPr>
+            <a:r>
+              <a:rPr lang="en-US" sz="2800" b="1" dirty="0"/>
+              <a:t>Results</a:t>
+            </a:r>
+          </a:p>
+        </p:txBody>
+      </p:sp>
+      <p:sp>
+        <p:nvSpPr>
+          <p:cNvPr id="71" name="TextBox 70"/>
+          <p:cNvSpPr txBox="1"/>
+          <p:nvPr/>
+        </p:nvSpPr>
+        <p:spPr>
+          <a:xfrm>
+            <a:off x="9130435" y="5798306"/>
+            <a:ext cx="3457672" cy="5909310"/>
+          </a:xfrm>
+          <a:prstGeom prst="rect">
+            <a:avLst/>
+          </a:prstGeom>
+          <a:solidFill>
+            <a:schemeClr val="bg2"/>
+          </a:solidFill>
+        </p:spPr>
+        <p:txBody>
+          <a:bodyPr wrap="square" rtlCol="0">
+            <a:spAutoFit/>
+          </a:bodyPr>
+          <a:lstStyle/>
+          <a:p>
+            <a:endParaRPr lang="en-US" sz="3150" dirty="0">
+              <a:solidFill>
+                <a:schemeClr val="tx1"/>
+              </a:solidFill>
+            </a:endParaRPr>
+          </a:p>
+          <a:p>
+            <a:endParaRPr lang="en-US" sz="3150" dirty="0">
+              <a:solidFill>
+                <a:schemeClr val="tx1"/>
+              </a:solidFill>
+            </a:endParaRPr>
+          </a:p>
+          <a:p>
+            <a:r>
+              <a:rPr lang="en-US" sz="3150" dirty="0">
+                <a:solidFill>
+                  <a:schemeClr val="bg1"/>
+                </a:solidFill>
+              </a:rPr>
+              <a:t>Graphical representation </a:t>
+            </a:r>
+          </a:p>
+          <a:p>
+            <a:endParaRPr lang="en-US" sz="3150" dirty="0">
+              <a:solidFill>
+                <a:schemeClr val="bg1"/>
+              </a:solidFill>
+            </a:endParaRPr>
+          </a:p>
+          <a:p>
+            <a:r>
+              <a:rPr lang="en-US" sz="3150" dirty="0">
+                <a:solidFill>
+                  <a:schemeClr val="bg1"/>
+                </a:solidFill>
+              </a:rPr>
+              <a:t>or the results</a:t>
+            </a:r>
+          </a:p>
+          <a:p>
+            <a:endParaRPr lang="en-US" sz="3150" dirty="0">
+              <a:solidFill>
+                <a:schemeClr val="tx1"/>
+              </a:solidFill>
+            </a:endParaRPr>
+          </a:p>
+          <a:p>
+            <a:endParaRPr lang="en-US" sz="3150" dirty="0">
+              <a:solidFill>
+                <a:schemeClr val="tx1"/>
+              </a:solidFill>
+            </a:endParaRPr>
+          </a:p>
+          <a:p>
+            <a:endParaRPr lang="en-US" sz="3150" dirty="0">
+              <a:solidFill>
+                <a:schemeClr val="tx1"/>
+              </a:solidFill>
+            </a:endParaRPr>
+          </a:p>
+          <a:p>
+            <a:endParaRPr lang="en-US" sz="3150" dirty="0">
+              <a:solidFill>
+                <a:schemeClr val="tx1"/>
+              </a:solidFill>
+            </a:endParaRPr>
+          </a:p>
+          <a:p>
+            <a:endParaRPr lang="en-US" sz="3150" dirty="0">
+              <a:solidFill>
+                <a:schemeClr val="tx1"/>
+              </a:solidFill>
+            </a:endParaRPr>
+          </a:p>
+          <a:p>
+            <a:endParaRPr lang="en-US" sz="3150" dirty="0">
+              <a:solidFill>
+                <a:schemeClr val="tx1"/>
+              </a:solidFill>
+            </a:endParaRPr>
+          </a:p>
+        </p:txBody>
+      </p:sp>
+      <p:sp>
+        <p:nvSpPr>
+          <p:cNvPr id="72" name="TextBox 71"/>
+          <p:cNvSpPr txBox="1"/>
+          <p:nvPr/>
+        </p:nvSpPr>
+        <p:spPr>
+          <a:xfrm>
+            <a:off x="12801495" y="13417428"/>
+            <a:ext cx="2933175" cy="3000821"/>
+          </a:xfrm>
+          <a:prstGeom prst="rect">
+            <a:avLst/>
+          </a:prstGeom>
+          <a:solidFill>
+            <a:schemeClr val="bg2"/>
+          </a:solidFill>
+        </p:spPr>
+        <p:txBody>
+          <a:bodyPr wrap="square" rtlCol="0">
+            <a:spAutoFit/>
+          </a:bodyPr>
+          <a:lstStyle/>
+          <a:p>
+            <a:endParaRPr lang="en-US" sz="3150" dirty="0">
+              <a:solidFill>
+                <a:schemeClr val="tx1"/>
+              </a:solidFill>
+            </a:endParaRPr>
+          </a:p>
+          <a:p>
+            <a:endParaRPr lang="en-US" sz="3150" dirty="0">
+              <a:solidFill>
+                <a:schemeClr val="tx1"/>
+              </a:solidFill>
+            </a:endParaRPr>
+          </a:p>
+          <a:p>
+            <a:r>
+              <a:rPr lang="en-US" sz="3150" dirty="0">
+                <a:solidFill>
+                  <a:schemeClr val="bg1"/>
+                </a:solidFill>
+              </a:rPr>
+              <a:t>Graphical representation for the results</a:t>
+            </a:r>
+          </a:p>
+          <a:p>
+            <a:endParaRPr lang="en-US" sz="3150" dirty="0">
+              <a:solidFill>
+                <a:schemeClr val="tx1"/>
+              </a:solidFill>
+            </a:endParaRPr>
+          </a:p>
+        </p:txBody>
+      </p:sp>
+      <p:sp>
+        <p:nvSpPr>
+          <p:cNvPr id="73" name="TextBox 72"/>
+          <p:cNvSpPr txBox="1"/>
+          <p:nvPr/>
+        </p:nvSpPr>
+        <p:spPr>
+          <a:xfrm>
+            <a:off x="13256573" y="5535852"/>
+            <a:ext cx="2933175" cy="2516073"/>
+          </a:xfrm>
+          <a:prstGeom prst="rect">
+            <a:avLst/>
+          </a:prstGeom>
+          <a:solidFill>
+            <a:schemeClr val="bg2"/>
+          </a:solidFill>
+        </p:spPr>
+        <p:txBody>
+          <a:bodyPr wrap="square" rtlCol="0">
+            <a:spAutoFit/>
+          </a:bodyPr>
+          <a:lstStyle/>
+          <a:p>
+            <a:endParaRPr lang="en-US" sz="3150" dirty="0">
+              <a:solidFill>
+                <a:schemeClr val="bg1"/>
+              </a:solidFill>
+            </a:endParaRPr>
+          </a:p>
+          <a:p>
+            <a:r>
+              <a:rPr lang="en-US" sz="3150" dirty="0">
+                <a:solidFill>
+                  <a:schemeClr val="bg1"/>
+                </a:solidFill>
+              </a:rPr>
+              <a:t>Graphical representation for the results</a:t>
+            </a:r>
+          </a:p>
+          <a:p>
+            <a:endParaRPr lang="en-US" sz="3150" dirty="0">
+              <a:solidFill>
+                <a:schemeClr val="tx1"/>
+              </a:solidFill>
+            </a:endParaRPr>
+          </a:p>
+        </p:txBody>
+      </p:sp>
+      <p:sp>
+        <p:nvSpPr>
+          <p:cNvPr id="75" name="Shape 132"/>
+          <p:cNvSpPr txBox="1"/>
+          <p:nvPr/>
+        </p:nvSpPr>
+        <p:spPr>
+          <a:xfrm>
+            <a:off x="13123123" y="8802793"/>
+            <a:ext cx="2877978" cy="2656996"/>
+          </a:xfrm>
+          <a:prstGeom prst="rect">
+            <a:avLst/>
+          </a:prstGeom>
+          <a:noFill/>
+          <a:ln>
+            <a:noFill/>
+          </a:ln>
+        </p:spPr>
+        <p:txBody>
+          <a:bodyPr lIns="133350" tIns="133350" rIns="133350" bIns="133350" anchor="t" anchorCtr="0">
+            <a:noAutofit/>
+          </a:bodyPr>
+          <a:lstStyle/>
           <a:p>
             <a:pPr>
               <a:buClr>
@@ -10610,272 +10890,21 @@
             </a:pPr>
             <a:r>
               <a:rPr lang="en-US" sz="1867" dirty="0"/>
-              <a:t> </a:t>
-            </a:r>
-          </a:p>
-        </p:txBody>
-      </p:sp>
-      <p:sp>
-        <p:nvSpPr>
-          <p:cNvPr id="68" name="Shape 133"/>
+              <a:t>XXXXXXXXXXXXXXXXXXXXXXXXXXXXXXXXXXXXXXXXXXXXXXXXXXXXXXXXXXXXXXXXXXXXXXXXXXXXXXXXXXXXXXXXXXXXXXXXXXXXXXXXXXXXXXXXXXXXXXXXXXXXXXXX</a:t>
+            </a:r>
+          </a:p>
+        </p:txBody>
+      </p:sp>
+      <p:sp>
+        <p:nvSpPr>
+          <p:cNvPr id="76" name="Shape 132"/>
           <p:cNvSpPr txBox="1"/>
           <p:nvPr/>
         </p:nvSpPr>
         <p:spPr>
           <a:xfrm>
-            <a:off x="8938705" y="3318264"/>
-            <a:ext cx="7917349" cy="430674"/>
-          </a:xfrm>
-          <a:prstGeom prst="rect">
-            <a:avLst/>
-          </a:prstGeom>
-          <a:noFill/>
-          <a:ln>
-            <a:noFill/>
-          </a:ln>
-        </p:spPr>
-        <p:txBody>
-          <a:bodyPr lIns="53331" tIns="53331" rIns="53331" bIns="53331" anchor="ctr" anchorCtr="0">
-            <a:noAutofit/>
-          </a:bodyPr>
-          <a:lstStyle/>
-          <a:p>
-            <a:pPr>
-              <a:buClr>
-                <a:srgbClr val="000000"/>
-              </a:buClr>
-              <a:buSzPct val="25000"/>
-            </a:pPr>
-            <a:r>
-              <a:rPr lang="en-US" sz="2800" b="1" dirty="0"/>
-              <a:t>Results</a:t>
-            </a:r>
-          </a:p>
-        </p:txBody>
-      </p:sp>
-      <p:sp>
-        <p:nvSpPr>
-          <p:cNvPr id="71" name="TextBox 70"/>
-          <p:cNvSpPr txBox="1"/>
-          <p:nvPr/>
-        </p:nvSpPr>
-        <p:spPr>
-          <a:xfrm>
-            <a:off x="9130435" y="5798306"/>
-            <a:ext cx="3457672" cy="5909310"/>
-          </a:xfrm>
-          <a:prstGeom prst="rect">
-            <a:avLst/>
-          </a:prstGeom>
-          <a:solidFill>
-            <a:schemeClr val="bg2"/>
-          </a:solidFill>
-        </p:spPr>
-        <p:txBody>
-          <a:bodyPr wrap="square" rtlCol="0">
-            <a:spAutoFit/>
-          </a:bodyPr>
-          <a:lstStyle/>
-          <a:p>
-            <a:endParaRPr lang="en-US" sz="3150" dirty="0">
-              <a:solidFill>
-                <a:schemeClr val="tx1"/>
-              </a:solidFill>
-            </a:endParaRPr>
-          </a:p>
-          <a:p>
-            <a:endParaRPr lang="en-US" sz="3150" dirty="0">
-              <a:solidFill>
-                <a:schemeClr val="tx1"/>
-              </a:solidFill>
-            </a:endParaRPr>
-          </a:p>
-          <a:p>
-            <a:r>
-              <a:rPr lang="en-US" sz="3150" dirty="0">
-                <a:solidFill>
-                  <a:schemeClr val="bg1"/>
-                </a:solidFill>
-              </a:rPr>
-              <a:t>Graphical representation </a:t>
-            </a:r>
-          </a:p>
-          <a:p>
-            <a:endParaRPr lang="en-US" sz="3150" dirty="0">
-              <a:solidFill>
-                <a:schemeClr val="bg1"/>
-              </a:solidFill>
-            </a:endParaRPr>
-          </a:p>
-          <a:p>
-            <a:r>
-              <a:rPr lang="en-US" sz="3150" dirty="0">
-                <a:solidFill>
-                  <a:schemeClr val="bg1"/>
-                </a:solidFill>
-              </a:rPr>
-              <a:t>or the results</a:t>
-            </a:r>
-          </a:p>
-          <a:p>
-            <a:endParaRPr lang="en-US" sz="3150" dirty="0">
-              <a:solidFill>
-                <a:schemeClr val="tx1"/>
-              </a:solidFill>
-            </a:endParaRPr>
-          </a:p>
-          <a:p>
-            <a:endParaRPr lang="en-US" sz="3150" dirty="0">
-              <a:solidFill>
-                <a:schemeClr val="tx1"/>
-              </a:solidFill>
-            </a:endParaRPr>
-          </a:p>
-          <a:p>
-            <a:endParaRPr lang="en-US" sz="3150" dirty="0">
-              <a:solidFill>
-                <a:schemeClr val="tx1"/>
-              </a:solidFill>
-            </a:endParaRPr>
-          </a:p>
-          <a:p>
-            <a:endParaRPr lang="en-US" sz="3150" dirty="0">
-              <a:solidFill>
-                <a:schemeClr val="tx1"/>
-              </a:solidFill>
-            </a:endParaRPr>
-          </a:p>
-          <a:p>
-            <a:endParaRPr lang="en-US" sz="3150" dirty="0">
-              <a:solidFill>
-                <a:schemeClr val="tx1"/>
-              </a:solidFill>
-            </a:endParaRPr>
-          </a:p>
-          <a:p>
-            <a:endParaRPr lang="en-US" sz="3150" dirty="0">
-              <a:solidFill>
-                <a:schemeClr val="tx1"/>
-              </a:solidFill>
-            </a:endParaRPr>
-          </a:p>
-        </p:txBody>
-      </p:sp>
-      <p:sp>
-        <p:nvSpPr>
-          <p:cNvPr id="72" name="TextBox 71"/>
-          <p:cNvSpPr txBox="1"/>
-          <p:nvPr/>
-        </p:nvSpPr>
-        <p:spPr>
-          <a:xfrm>
-            <a:off x="12801495" y="13417428"/>
-            <a:ext cx="2933175" cy="3000821"/>
-          </a:xfrm>
-          <a:prstGeom prst="rect">
-            <a:avLst/>
-          </a:prstGeom>
-          <a:solidFill>
-            <a:schemeClr val="bg2"/>
-          </a:solidFill>
-        </p:spPr>
-        <p:txBody>
-          <a:bodyPr wrap="square" rtlCol="0">
-            <a:spAutoFit/>
-          </a:bodyPr>
-          <a:lstStyle/>
-          <a:p>
-            <a:endParaRPr lang="en-US" sz="3150" dirty="0">
-              <a:solidFill>
-                <a:schemeClr val="tx1"/>
-              </a:solidFill>
-            </a:endParaRPr>
-          </a:p>
-          <a:p>
-            <a:endParaRPr lang="en-US" sz="3150" dirty="0">
-              <a:solidFill>
-                <a:schemeClr val="tx1"/>
-              </a:solidFill>
-            </a:endParaRPr>
-          </a:p>
-          <a:p>
-            <a:r>
-              <a:rPr lang="en-US" sz="3150" dirty="0">
-                <a:solidFill>
-                  <a:schemeClr val="bg1"/>
-                </a:solidFill>
-              </a:rPr>
-              <a:t>Graphical representation for the results</a:t>
-            </a:r>
-          </a:p>
-          <a:p>
-            <a:endParaRPr lang="en-US" sz="3150" dirty="0">
-              <a:solidFill>
-                <a:schemeClr val="tx1"/>
-              </a:solidFill>
-            </a:endParaRPr>
-          </a:p>
-        </p:txBody>
-      </p:sp>
-      <p:sp>
-        <p:nvSpPr>
-          <p:cNvPr id="73" name="TextBox 72"/>
-          <p:cNvSpPr txBox="1"/>
-          <p:nvPr/>
-        </p:nvSpPr>
-        <p:spPr>
-          <a:xfrm>
-            <a:off x="13256573" y="5535852"/>
-            <a:ext cx="2933175" cy="2516073"/>
-          </a:xfrm>
-          <a:prstGeom prst="rect">
-            <a:avLst/>
-          </a:prstGeom>
-          <a:solidFill>
-            <a:schemeClr val="bg2"/>
-          </a:solidFill>
-        </p:spPr>
-        <p:txBody>
-          <a:bodyPr wrap="square" rtlCol="0">
-            <a:spAutoFit/>
-          </a:bodyPr>
-          <a:lstStyle/>
-          <a:p>
-            <a:endParaRPr lang="en-US" sz="3150" dirty="0">
-              <a:solidFill>
-                <a:schemeClr val="bg1"/>
-              </a:solidFill>
-            </a:endParaRPr>
-          </a:p>
-          <a:p>
-            <a:r>
-              <a:rPr lang="en-US" sz="3150" dirty="0">
-                <a:solidFill>
-                  <a:schemeClr val="bg1"/>
-                </a:solidFill>
-              </a:rPr>
-              <a:t>Graphical representation for the results</a:t>
-            </a:r>
-          </a:p>
-          <a:p>
-            <a:endParaRPr lang="en-US" sz="3150" dirty="0">
-              <a:solidFill>
-                <a:schemeClr val="tx1"/>
-              </a:solidFill>
-            </a:endParaRPr>
-          </a:p>
-        </p:txBody>
-      </p:sp>
-      <p:sp>
-        <p:nvSpPr>
-          <p:cNvPr id="75" name="Shape 132"/>
-          <p:cNvSpPr txBox="1"/>
-          <p:nvPr/>
-        </p:nvSpPr>
-        <p:spPr>
-          <a:xfrm>
-            <a:off x="13123123" y="8802793"/>
-            <a:ext cx="2877978" cy="2656996"/>
+            <a:off x="9101138" y="16459658"/>
+            <a:ext cx="2877978" cy="1323152"/>
           </a:xfrm>
           <a:prstGeom prst="rect">
             <a:avLst/>
@@ -10901,35 +10930,14 @@
             </a:pPr>
             <a:r>
               <a:rPr lang="en-US" sz="1867" dirty="0"/>
-              <a:t>XXXXXXXXXXXXXXXXXXXXXXXXXXXXXXXXXXXXXXXXXXXXXXXXXXXXXXXXXXXXXXXXXXXXXXXXXXXXXXXXXXXXXXXXXXXXXXXXXXXXXXXXXXXXXXXXXXXXXXXXXXXXXXXX</a:t>
-            </a:r>
-          </a:p>
-        </p:txBody>
-      </p:sp>
-      <p:sp>
-        <p:nvSpPr>
-          <p:cNvPr id="76" name="Shape 132"/>
-          <p:cNvSpPr txBox="1"/>
-          <p:nvPr/>
-        </p:nvSpPr>
-        <p:spPr>
-          <a:xfrm>
-            <a:off x="9101138" y="16459658"/>
-            <a:ext cx="2877978" cy="1323152"/>
-          </a:xfrm>
-          <a:prstGeom prst="rect">
-            <a:avLst/>
-          </a:prstGeom>
-          <a:noFill/>
-          <a:ln>
-            <a:noFill/>
-          </a:ln>
-        </p:spPr>
-        <p:txBody>
-          <a:bodyPr lIns="133350" tIns="133350" rIns="133350" bIns="133350" anchor="t" anchorCtr="0">
-            <a:noAutofit/>
-          </a:bodyPr>
-          <a:lstStyle/>
+              <a:t>Figure captions </a:t>
+            </a:r>
+            <a:r>
+              <a:rPr lang="en-US" sz="1867" dirty="0" err="1"/>
+              <a:t>xxxxxxx</a:t>
+            </a:r>
+            <a:endParaRPr lang="en-US" sz="1867" dirty="0"/>
+          </a:p>
           <a:p>
             <a:pPr>
               <a:buClr>
@@ -10940,12 +10948,8 @@
               <a:buChar char=""/>
             </a:pPr>
             <a:r>
-              <a:rPr lang="en-US" sz="1867" dirty="0"/>
-              <a:t>Figure captions </a:t>
-            </a:r>
-            <a:r>
               <a:rPr lang="en-US" sz="1867" dirty="0" err="1"/>
-              <a:t>xxxxxxx</a:t>
+              <a:t>Xxxxxxxxxxxxxxxxxxxxx</a:t>
             </a:r>
             <a:endParaRPr lang="en-US" sz="1867" dirty="0"/>
           </a:p>
@@ -10960,7 +10964,110 @@
             </a:pPr>
             <a:r>
               <a:rPr lang="en-US" sz="1867" dirty="0" err="1"/>
-              <a:t>Xxxxxxxxxxxxxxxxxxxxx</a:t>
+              <a:t>xxxxxxxxxxxxxxxxx</a:t>
+            </a:r>
+            <a:endParaRPr lang="en-US" sz="1867" dirty="0"/>
+          </a:p>
+        </p:txBody>
+      </p:sp>
+      <p:sp>
+        <p:nvSpPr>
+          <p:cNvPr id="78" name="TextBox 77"/>
+          <p:cNvSpPr txBox="1"/>
+          <p:nvPr/>
+        </p:nvSpPr>
+        <p:spPr>
+          <a:xfrm>
+            <a:off x="9250613" y="13445789"/>
+            <a:ext cx="2933175" cy="3000821"/>
+          </a:xfrm>
+          <a:prstGeom prst="rect">
+            <a:avLst/>
+          </a:prstGeom>
+          <a:solidFill>
+            <a:schemeClr val="bg2"/>
+          </a:solidFill>
+        </p:spPr>
+        <p:txBody>
+          <a:bodyPr wrap="square" rtlCol="0">
+            <a:spAutoFit/>
+          </a:bodyPr>
+          <a:lstStyle/>
+          <a:p>
+            <a:endParaRPr lang="en-US" sz="3150" dirty="0">
+              <a:solidFill>
+                <a:schemeClr val="tx1"/>
+              </a:solidFill>
+            </a:endParaRPr>
+          </a:p>
+          <a:p>
+            <a:endParaRPr lang="en-US" sz="3150" dirty="0">
+              <a:solidFill>
+                <a:schemeClr val="tx1"/>
+              </a:solidFill>
+            </a:endParaRPr>
+          </a:p>
+          <a:p>
+            <a:r>
+              <a:rPr lang="en-US" sz="3150" dirty="0">
+                <a:solidFill>
+                  <a:schemeClr val="bg1"/>
+                </a:solidFill>
+              </a:rPr>
+              <a:t>Graphical representation for the results</a:t>
+            </a:r>
+          </a:p>
+          <a:p>
+            <a:endParaRPr lang="en-US" sz="3150" dirty="0">
+              <a:solidFill>
+                <a:schemeClr val="tx1"/>
+              </a:solidFill>
+            </a:endParaRPr>
+          </a:p>
+        </p:txBody>
+      </p:sp>
+      <p:sp>
+        <p:nvSpPr>
+          <p:cNvPr id="79" name="Shape 132"/>
+          <p:cNvSpPr txBox="1"/>
+          <p:nvPr/>
+        </p:nvSpPr>
+        <p:spPr>
+          <a:xfrm>
+            <a:off x="17327560" y="3715595"/>
+            <a:ext cx="7928199" cy="1672970"/>
+          </a:xfrm>
+          <a:prstGeom prst="rect">
+            <a:avLst/>
+          </a:prstGeom>
+          <a:noFill/>
+          <a:ln>
+            <a:noFill/>
+          </a:ln>
+        </p:spPr>
+        <p:txBody>
+          <a:bodyPr lIns="133350" tIns="133350" rIns="133350" bIns="133350" anchor="t" anchorCtr="0">
+            <a:noAutofit/>
+          </a:bodyPr>
+          <a:lstStyle/>
+          <a:p>
+            <a:pPr>
+              <a:buClr>
+                <a:srgbClr val="000000"/>
+              </a:buClr>
+              <a:buSzPct val="25000"/>
+            </a:pPr>
+            <a:r>
+              <a:rPr lang="en-US" sz="1867" dirty="0" smtClean="0"/>
+              <a:t>A reinforcement learning algorithm was created using the current time, the charge in the system battery, and the load and solar energy generated by a facility</a:t>
+            </a:r>
+            <a:r>
+              <a:rPr lang="en-US" sz="1867" dirty="0" smtClean="0"/>
+              <a:t>. </a:t>
+            </a:r>
+            <a:r>
+              <a:rPr lang="en-US" sz="1867" dirty="0" smtClean="0"/>
+              <a:t>By implementing a reinforcement learning algorithm the net gain of the Micro-grid was able to surpass the net gain of the SELECT algorithm. </a:t>
             </a:r>
             <a:endParaRPr lang="en-US" sz="1867" dirty="0"/>
           </a:p>
@@ -10974,117 +11081,6 @@
               <a:buChar char=""/>
             </a:pPr>
             <a:r>
-              <a:rPr lang="en-US" sz="1867" dirty="0" err="1"/>
-              <a:t>xxxxxxxxxxxxxxxxx</a:t>
-            </a:r>
-            <a:endParaRPr lang="en-US" sz="1867" dirty="0"/>
-          </a:p>
-        </p:txBody>
-      </p:sp>
-      <p:sp>
-        <p:nvSpPr>
-          <p:cNvPr id="78" name="TextBox 77"/>
-          <p:cNvSpPr txBox="1"/>
-          <p:nvPr/>
-        </p:nvSpPr>
-        <p:spPr>
-          <a:xfrm>
-            <a:off x="9250613" y="13445789"/>
-            <a:ext cx="2933175" cy="3000821"/>
-          </a:xfrm>
-          <a:prstGeom prst="rect">
-            <a:avLst/>
-          </a:prstGeom>
-          <a:solidFill>
-            <a:schemeClr val="bg2"/>
-          </a:solidFill>
-        </p:spPr>
-        <p:txBody>
-          <a:bodyPr wrap="square" rtlCol="0">
-            <a:spAutoFit/>
-          </a:bodyPr>
-          <a:lstStyle/>
-          <a:p>
-            <a:endParaRPr lang="en-US" sz="3150" dirty="0">
-              <a:solidFill>
-                <a:schemeClr val="tx1"/>
-              </a:solidFill>
-            </a:endParaRPr>
-          </a:p>
-          <a:p>
-            <a:endParaRPr lang="en-US" sz="3150" dirty="0">
-              <a:solidFill>
-                <a:schemeClr val="tx1"/>
-              </a:solidFill>
-            </a:endParaRPr>
-          </a:p>
-          <a:p>
-            <a:r>
-              <a:rPr lang="en-US" sz="3150" dirty="0">
-                <a:solidFill>
-                  <a:schemeClr val="bg1"/>
-                </a:solidFill>
-              </a:rPr>
-              <a:t>Graphical representation for the results</a:t>
-            </a:r>
-          </a:p>
-          <a:p>
-            <a:endParaRPr lang="en-US" sz="3150" dirty="0">
-              <a:solidFill>
-                <a:schemeClr val="tx1"/>
-              </a:solidFill>
-            </a:endParaRPr>
-          </a:p>
-        </p:txBody>
-      </p:sp>
-      <p:sp>
-        <p:nvSpPr>
-          <p:cNvPr id="79" name="Shape 132"/>
-          <p:cNvSpPr txBox="1"/>
-          <p:nvPr/>
-        </p:nvSpPr>
-        <p:spPr>
-          <a:xfrm>
-            <a:off x="17327560" y="3715595"/>
-            <a:ext cx="7928199" cy="1672970"/>
-          </a:xfrm>
-          <a:prstGeom prst="rect">
-            <a:avLst/>
-          </a:prstGeom>
-          <a:noFill/>
-          <a:ln>
-            <a:noFill/>
-          </a:ln>
-        </p:spPr>
-        <p:txBody>
-          <a:bodyPr lIns="133350" tIns="133350" rIns="133350" bIns="133350" anchor="t" anchorCtr="0">
-            <a:noAutofit/>
-          </a:bodyPr>
-          <a:lstStyle/>
-          <a:p>
-            <a:pPr>
-              <a:buClr>
-                <a:srgbClr val="000000"/>
-              </a:buClr>
-              <a:buSzPct val="25000"/>
-              <a:buFont typeface="Arial"/>
-              <a:buChar char=""/>
-            </a:pPr>
-            <a:r>
-              <a:rPr lang="en-US" sz="1867" dirty="0"/>
-              <a:t>XXXXXXXXXXXXXXXXXXXXXXXXXXXXXXXXXXXXXXXXXXXXXXXXXXXXXXXXXXXXXXXXXXXXXXXXXXXXXXXXXXXXXXXXXXXXXXXXXXXXXXXXXXXXXXXXXXXXXXXXXXXXXXXXXXXXXXXXXXXXXXXXXXXXXXXXXXXXXXXXXXXXXXXXXXXXXXXXXXXXXXXXXXXXXXXXXXX.</a:t>
-            </a:r>
-          </a:p>
-          <a:p>
-            <a:pPr>
-              <a:buClr>
-                <a:srgbClr val="000000"/>
-              </a:buClr>
-              <a:buSzPct val="25000"/>
-              <a:buFont typeface="Arial"/>
-              <a:buChar char=""/>
-            </a:pPr>
-            <a:r>
               <a:rPr lang="en-US" sz="1867" dirty="0"/>
               <a:t> </a:t>
             </a:r>
@@ -11159,13 +11155,36 @@
                 <a:srgbClr val="000000"/>
               </a:buClr>
               <a:buSzPct val="25000"/>
-              <a:buFont typeface="Arial"/>
-              <a:buChar char=""/>
             </a:pPr>
             <a:r>
+              <a:rPr lang="en-US" sz="1867" dirty="0" smtClean="0"/>
+              <a:t>Future work on this project could include a Neural Network</a:t>
+            </a:r>
+            <a:r>
+              <a:rPr lang="en-US" sz="1867" dirty="0" smtClean="0"/>
+              <a:t> (NN)</a:t>
+            </a:r>
+            <a:r>
+              <a:rPr lang="en-US" sz="1867" dirty="0" smtClean="0"/>
+              <a:t> to predict the solar energy generation of the Micro-grid. By using a NN to predict the generated solar energy the machine learning model can become more accurate and efficient</a:t>
+            </a:r>
+            <a:r>
               <a:rPr lang="en-US" sz="1867" dirty="0"/>
-              <a:t>XXXXXXXXXXXXXXXXXXXXXXXXXXXXXXXXXXXXXXXXXXXXXXXXXXXXXXXXXXXXXXXXXXXXXXXXXXXXXXXXXXXXXXXXXXXXXXXXXXXXXXXXXXXXXXXXXXXXXXXXXXXXXXXXXXXXXXXXXXXXXXXXXXXXXXXXXXXXXXXXXXXXXXXXXXXXXXXXXXXXXXXXXXXXXXXXXXX.</a:t>
-            </a:r>
+              <a:t>. By doing this the model could use the weather data supplied from a local weather station to predict the energy generated </a:t>
+            </a:r>
+            <a:r>
+              <a:rPr lang="en-US" sz="1867" dirty="0" err="1"/>
+              <a:t>andt</a:t>
+            </a:r>
+            <a:r>
+              <a:rPr lang="en-US" sz="1867" dirty="0"/>
+              <a:t> hen compare the predicted energy to the actual energy. </a:t>
+            </a:r>
+            <a:r>
+              <a:rPr lang="en-US" sz="1867" dirty="0" smtClean="0"/>
+              <a:t>The current machine learning algorithm uses a value iteration model that is deterministic, but if the NN was to be implemented the model would need to include a discount factor and become probabilistic to account for the prediction and correction of the energy generation. </a:t>
+            </a:r>
+            <a:endParaRPr lang="en-US" sz="1867" dirty="0"/>
           </a:p>
           <a:p>
             <a:pPr>
@@ -11189,31 +11208,6 @@
             </a:pPr>
             <a:endParaRPr lang="en-US" sz="1867" dirty="0"/>
           </a:p>
-          <a:p>
-            <a:pPr>
-              <a:buClr>
-                <a:srgbClr val="000000"/>
-              </a:buClr>
-              <a:buSzPct val="25000"/>
-              <a:buFont typeface="Arial"/>
-              <a:buChar char=""/>
-            </a:pPr>
-            <a:r>
-              <a:rPr lang="en-US" sz="1867" dirty="0"/>
-              <a:t> </a:t>
-            </a:r>
-          </a:p>
-          <a:p>
-            <a:pPr>
-              <a:buClr>
-                <a:srgbClr val="000000"/>
-              </a:buClr>
-              <a:buSzPct val="25000"/>
-              <a:buFont typeface="Arial"/>
-              <a:buChar char=""/>
-            </a:pPr>
-            <a:endParaRPr lang="en-US" sz="1867" dirty="0"/>
-          </a:p>
         </p:txBody>
       </p:sp>
       <p:sp>
@@ -11248,9 +11242,10 @@
               <a:buSzPct val="25000"/>
             </a:pPr>
             <a:r>
-              <a:rPr lang="en-US" sz="2800" b="1" dirty="0"/>
-              <a:t>Conclusion</a:t>
-            </a:r>
+              <a:rPr lang="en-US" sz="2800" b="1" dirty="0" smtClean="0"/>
+              <a:t>Future Work</a:t>
+            </a:r>
+            <a:endParaRPr lang="en-US" sz="2800" b="1" dirty="0"/>
           </a:p>
         </p:txBody>
       </p:sp>
@@ -11284,8 +11279,6 @@
                 <a:srgbClr val="000000"/>
               </a:buClr>
               <a:buSzPct val="25000"/>
-              <a:buFont typeface="Arial"/>
-              <a:buChar char=""/>
             </a:pPr>
             <a:r>
               <a:rPr lang="en-US" sz="1867" dirty="0"/>
@@ -11545,7 +11538,7 @@
         </p:nvSpPr>
         <p:spPr>
           <a:xfrm>
-            <a:off x="17338410" y="7913943"/>
+            <a:off x="17302370" y="13906810"/>
             <a:ext cx="7917349" cy="430674"/>
           </a:xfrm>
           <a:prstGeom prst="rect">
@@ -11572,107 +11565,6 @@
               <a:rPr lang="en-US" sz="2800" b="1" dirty="0"/>
               <a:t>Computational Study</a:t>
             </a:r>
-          </a:p>
-        </p:txBody>
-      </p:sp>
-      <p:sp>
-        <p:nvSpPr>
-          <p:cNvPr id="60" name="TextBox 59"/>
-          <p:cNvSpPr txBox="1"/>
-          <p:nvPr/>
-        </p:nvSpPr>
-        <p:spPr>
-          <a:xfrm>
-            <a:off x="17760796" y="8538737"/>
-            <a:ext cx="3457672" cy="5424562"/>
-          </a:xfrm>
-          <a:prstGeom prst="rect">
-            <a:avLst/>
-          </a:prstGeom>
-          <a:solidFill>
-            <a:schemeClr val="bg2"/>
-          </a:solidFill>
-        </p:spPr>
-        <p:txBody>
-          <a:bodyPr wrap="square" rtlCol="0">
-            <a:spAutoFit/>
-          </a:bodyPr>
-          <a:lstStyle/>
-          <a:p>
-            <a:endParaRPr lang="en-US" sz="3150" dirty="0">
-              <a:solidFill>
-                <a:schemeClr val="tx1"/>
-              </a:solidFill>
-            </a:endParaRPr>
-          </a:p>
-          <a:p>
-            <a:endParaRPr lang="en-US" sz="3150" dirty="0">
-              <a:solidFill>
-                <a:schemeClr val="tx1"/>
-              </a:solidFill>
-            </a:endParaRPr>
-          </a:p>
-          <a:p>
-            <a:r>
-              <a:rPr lang="en-US" sz="3150" dirty="0">
-                <a:solidFill>
-                  <a:schemeClr val="bg1"/>
-                </a:solidFill>
-              </a:rPr>
-              <a:t>Graphical representation </a:t>
-            </a:r>
-          </a:p>
-          <a:p>
-            <a:r>
-              <a:rPr lang="en-US" sz="3150" dirty="0">
-                <a:solidFill>
-                  <a:schemeClr val="bg1"/>
-                </a:solidFill>
-              </a:rPr>
-              <a:t>Of study</a:t>
-            </a:r>
-          </a:p>
-          <a:p>
-            <a:endParaRPr lang="en-US" sz="3150" dirty="0">
-              <a:solidFill>
-                <a:schemeClr val="tx1"/>
-              </a:solidFill>
-            </a:endParaRPr>
-          </a:p>
-          <a:p>
-            <a:endParaRPr lang="en-US" sz="3150" dirty="0">
-              <a:solidFill>
-                <a:schemeClr val="tx1"/>
-              </a:solidFill>
-            </a:endParaRPr>
-          </a:p>
-          <a:p>
-            <a:endParaRPr lang="en-US" sz="3150" dirty="0">
-              <a:solidFill>
-                <a:schemeClr val="tx1"/>
-              </a:solidFill>
-            </a:endParaRPr>
-          </a:p>
-          <a:p>
-            <a:endParaRPr lang="en-US" sz="3150" dirty="0">
-              <a:solidFill>
-                <a:schemeClr val="tx1"/>
-              </a:solidFill>
-            </a:endParaRPr>
-          </a:p>
-          <a:p>
-            <a:endParaRPr lang="en-US" sz="3150" dirty="0">
-              <a:solidFill>
-                <a:schemeClr val="tx1"/>
-              </a:solidFill>
-            </a:endParaRPr>
-          </a:p>
-          <a:p>
-            <a:endParaRPr lang="en-US" sz="3150" dirty="0">
-              <a:solidFill>
-                <a:schemeClr val="tx1"/>
-              </a:solidFill>
-            </a:endParaRPr>
           </a:p>
         </p:txBody>
       </p:sp>
@@ -11766,6 +11658,87 @@
           </a:prstGeom>
         </p:spPr>
       </p:pic>
+      <p:pic>
+        <p:nvPicPr>
+          <p:cNvPr id="6" name="Picture 5"/>
+          <p:cNvPicPr>
+            <a:picLocks noChangeAspect="1"/>
+          </p:cNvPicPr>
+          <p:nvPr/>
+        </p:nvPicPr>
+        <p:blipFill>
+          <a:blip r:embed="rId8"/>
+          <a:stretch>
+            <a:fillRect/>
+          </a:stretch>
+        </p:blipFill>
+        <p:spPr>
+          <a:xfrm>
+            <a:off x="18327630" y="9359818"/>
+            <a:ext cx="5781675" cy="4352925"/>
+          </a:xfrm>
+          <a:prstGeom prst="rect">
+            <a:avLst/>
+          </a:prstGeom>
+        </p:spPr>
+      </p:pic>
+      <p:sp>
+        <p:nvSpPr>
+          <p:cNvPr id="69" name="Shape 132"/>
+          <p:cNvSpPr txBox="1"/>
+          <p:nvPr/>
+        </p:nvSpPr>
+        <p:spPr>
+          <a:xfrm>
+            <a:off x="17327560" y="14448047"/>
+            <a:ext cx="7928199" cy="1672970"/>
+          </a:xfrm>
+          <a:prstGeom prst="rect">
+            <a:avLst/>
+          </a:prstGeom>
+          <a:noFill/>
+          <a:ln>
+            <a:noFill/>
+          </a:ln>
+        </p:spPr>
+        <p:txBody>
+          <a:bodyPr lIns="133350" tIns="133350" rIns="133350" bIns="133350" anchor="t" anchorCtr="0">
+            <a:noAutofit/>
+          </a:bodyPr>
+          <a:lstStyle/>
+          <a:p>
+            <a:pPr>
+              <a:buClr>
+                <a:srgbClr val="000000"/>
+              </a:buClr>
+              <a:buSzPct val="25000"/>
+            </a:pPr>
+            <a:r>
+              <a:rPr lang="en-US" sz="1867" dirty="0" smtClean="0"/>
+              <a:t>For </a:t>
+            </a:r>
+            <a:r>
+              <a:rPr lang="en-US" sz="1867" dirty="0"/>
+              <a:t>the deterministic model the data that was used was an hourly load of a facility, the solar generation of the facility, and the price of the electricity for a given time. Using this data the machine learning model’s net gain and the SELECT model’s net gain was calculated for a three day period and compared to one another. </a:t>
+            </a:r>
+          </a:p>
+          <a:p>
+            <a:pPr>
+              <a:buClr>
+                <a:srgbClr val="000000"/>
+              </a:buClr>
+              <a:buSzPct val="25000"/>
+              <a:buFont typeface="Arial"/>
+              <a:buChar char=""/>
+            </a:pPr>
+            <a:r>
+              <a:rPr lang="en-US" sz="1867" dirty="0" smtClean="0"/>
+              <a:t> </a:t>
+            </a:r>
+            <a:endParaRPr lang="en-US" sz="1867" dirty="0"/>
+          </a:p>
+        </p:txBody>
+      </p:sp>
     </p:spTree>
   </p:cSld>
   <p:clrMapOvr>

</xml_diff>